<commit_message>
Updates for PRPE paper
</commit_message>
<xml_diff>
--- a/documents/202425s2-RM-Slides-Sy.pptx
+++ b/documents/202425s2-RM-Slides-Sy.pptx
@@ -5,7 +5,7 @@
     <p:sldMasterId id="2147483657" r:id="rId1"/>
   </p:sldMasterIdLst>
   <p:notesMasterIdLst>
-    <p:notesMasterId r:id="rId9"/>
+    <p:notesMasterId r:id="rId11"/>
   </p:notesMasterIdLst>
   <p:sldIdLst>
     <p:sldId id="256" r:id="rId2"/>
@@ -15,6 +15,8 @@
     <p:sldId id="301" r:id="rId6"/>
     <p:sldId id="261" r:id="rId7"/>
     <p:sldId id="303" r:id="rId8"/>
+    <p:sldId id="304" r:id="rId9"/>
+    <p:sldId id="305" r:id="rId10"/>
   </p:sldIdLst>
   <p:sldSz cx="12192000" cy="6858000"/>
   <p:notesSz cx="6858000" cy="9144000"/>
@@ -8757,7 +8759,7 @@
           </a:lstStyle>
           <a:p>
             <a:r>
-              <a:rPr lang="en-US"/>
+              <a:rPr lang="en-US" dirty="0"/>
               <a:t>2025.02.06</a:t>
             </a:r>
             <a:endParaRPr lang="en-PH" dirty="0"/>
@@ -20621,7 +20623,7 @@
           <p:cNvPr id="2" name="Title 1">
             <a:extLst>
               <a:ext uri="{FF2B5EF4-FFF2-40B4-BE49-F238E27FC236}">
-                <a16:creationId xmlns:a16="http://schemas.microsoft.com/office/drawing/2014/main" id="{2F87BFAE-5BA8-4BC2-01ED-900EBDF89C24}"/>
+                <a16:creationId xmlns:a16="http://schemas.microsoft.com/office/drawing/2014/main" id="{6AA1FFC5-1CB7-8737-4D8B-74F6116151DF}"/>
               </a:ext>
             </a:extLst>
           </p:cNvPr>
@@ -20637,7 +20639,10 @@
           <a:bodyPr/>
           <a:lstStyle/>
           <a:p>
-            <a:endParaRPr lang="en-PH"/>
+            <a:r>
+              <a:rPr lang="en-PH" dirty="0"/>
+              <a:t>Comparison with Nitta model (2010)</a:t>
+            </a:r>
           </a:p>
         </p:txBody>
       </p:sp>
@@ -20646,7 +20651,7 @@
           <p:cNvPr id="3" name="Content Placeholder 2">
             <a:extLst>
               <a:ext uri="{FF2B5EF4-FFF2-40B4-BE49-F238E27FC236}">
-                <a16:creationId xmlns:a16="http://schemas.microsoft.com/office/drawing/2014/main" id="{9200911F-B647-2DC0-959F-C90DA4B173F2}"/>
+                <a16:creationId xmlns:a16="http://schemas.microsoft.com/office/drawing/2014/main" id="{C2EDBC3B-B420-0390-7099-D0FC5FED7881}"/>
               </a:ext>
             </a:extLst>
           </p:cNvPr>
@@ -20662,7 +20667,46 @@
           <a:bodyPr/>
           <a:lstStyle/>
           <a:p>
-            <a:endParaRPr lang="en-PH"/>
+            <a:pPr marL="0" indent="0">
+              <a:buNone/>
+            </a:pPr>
+            <a:r>
+              <a:rPr lang="en-PH" b="1" u="sng" dirty="0"/>
+              <a:t>Observations:</a:t>
+            </a:r>
+          </a:p>
+          <a:p>
+            <a:r>
+              <a:rPr lang="en-PH" dirty="0"/>
+              <a:t>Close to Nitta for favorable conditions of PI</a:t>
+            </a:r>
+          </a:p>
+          <a:p>
+            <a:pPr lvl="1"/>
+            <a:r>
+              <a:rPr lang="en-PH" dirty="0"/>
+              <a:t>Small, fast, homogenous</a:t>
+            </a:r>
+          </a:p>
+          <a:p>
+            <a:r>
+              <a:rPr lang="en-PH" dirty="0"/>
+              <a:t>TI does not conform at all (positive concavity)</a:t>
+            </a:r>
+          </a:p>
+          <a:p>
+            <a:r>
+              <a:rPr lang="en-PH" dirty="0"/>
+              <a:t>Pls see </a:t>
+            </a:r>
+            <a:r>
+              <a:rPr lang="en-PH" i="1" dirty="0"/>
+              <a:t>/output/analysis/return-map </a:t>
+            </a:r>
+            <a:r>
+              <a:rPr lang="en-PH" dirty="0"/>
+              <a:t>for plots</a:t>
+            </a:r>
           </a:p>
         </p:txBody>
       </p:sp>
@@ -20671,7 +20715,7 @@
           <p:cNvPr id="4" name="Slide Number Placeholder 3">
             <a:extLst>
               <a:ext uri="{FF2B5EF4-FFF2-40B4-BE49-F238E27FC236}">
-                <a16:creationId xmlns:a16="http://schemas.microsoft.com/office/drawing/2014/main" id="{0D9A6018-0380-09A3-5477-36FBEF3D2098}"/>
+                <a16:creationId xmlns:a16="http://schemas.microsoft.com/office/drawing/2014/main" id="{E2B0BEA7-2729-8D25-2C58-8416A7CF7B42}"/>
               </a:ext>
             </a:extLst>
           </p:cNvPr>
@@ -20700,7 +20744,256 @@
           <p:cNvPr id="5" name="Footer Placeholder 4">
             <a:extLst>
               <a:ext uri="{FF2B5EF4-FFF2-40B4-BE49-F238E27FC236}">
-                <a16:creationId xmlns:a16="http://schemas.microsoft.com/office/drawing/2014/main" id="{FB20E994-30E1-D2B9-76FD-6151E114F94D}"/>
+                <a16:creationId xmlns:a16="http://schemas.microsoft.com/office/drawing/2014/main" id="{77E1B17F-B12F-4DBC-5E24-A670CF4AA6DE}"/>
+              </a:ext>
+            </a:extLst>
+          </p:cNvPr>
+          <p:cNvSpPr>
+            <a:spLocks noGrp="1"/>
+          </p:cNvSpPr>
+          <p:nvPr>
+            <p:ph type="ftr" sz="quarter" idx="3"/>
+          </p:nvPr>
+        </p:nvSpPr>
+        <p:spPr/>
+        <p:txBody>
+          <a:bodyPr/>
+          <a:lstStyle/>
+          <a:p>
+            <a:pPr algn="l"/>
+            <a:r>
+              <a:rPr lang="en-PH" dirty="0"/>
+              <a:t>https://journals.aps.org/prper/abstract/10.1103/PhysRevSTPER.6.020105</a:t>
+            </a:r>
+          </a:p>
+        </p:txBody>
+      </p:sp>
+      <p:sp>
+        <p:nvSpPr>
+          <p:cNvPr id="6" name="Date Placeholder 5">
+            <a:extLst>
+              <a:ext uri="{FF2B5EF4-FFF2-40B4-BE49-F238E27FC236}">
+                <a16:creationId xmlns:a16="http://schemas.microsoft.com/office/drawing/2014/main" id="{6126AA6D-9B6D-71CB-EB8B-F6376B0EBA19}"/>
+              </a:ext>
+            </a:extLst>
+          </p:cNvPr>
+          <p:cNvSpPr>
+            <a:spLocks noGrp="1"/>
+          </p:cNvSpPr>
+          <p:nvPr>
+            <p:ph type="dt" sz="half" idx="2"/>
+          </p:nvPr>
+        </p:nvSpPr>
+        <p:spPr/>
+        <p:txBody>
+          <a:bodyPr/>
+          <a:lstStyle/>
+          <a:p>
+            <a:r>
+              <a:rPr lang="en-US"/>
+              <a:t>2025.02.06</a:t>
+            </a:r>
+            <a:endParaRPr lang="en-PH" dirty="0"/>
+          </a:p>
+        </p:txBody>
+      </p:sp>
+    </p:spTree>
+    <p:extLst>
+      <p:ext uri="{BB962C8B-B14F-4D97-AF65-F5344CB8AC3E}">
+        <p14:creationId xmlns:p14="http://schemas.microsoft.com/office/powerpoint/2010/main" val="2717875455"/>
+      </p:ext>
+    </p:extLst>
+  </p:cSld>
+  <p:clrMapOvr>
+    <a:masterClrMapping/>
+  </p:clrMapOvr>
+  <mc:AlternateContent xmlns:mc="http://schemas.openxmlformats.org/markup-compatibility/2006" xmlns:p14="http://schemas.microsoft.com/office/powerpoint/2010/main">
+    <mc:Choice Requires="p14">
+      <p:transition p14:dur="200">
+        <p:fade/>
+      </p:transition>
+    </mc:Choice>
+    <mc:Fallback xmlns="">
+      <p:transition>
+        <p:fade/>
+      </p:transition>
+    </mc:Fallback>
+  </mc:AlternateContent>
+</p:sld>
+</file>
+
+<file path=ppt/slides/slide8.xml><?xml version="1.0" encoding="utf-8"?>
+<p:sld xmlns:a="http://schemas.openxmlformats.org/drawingml/2006/main" xmlns:r="http://schemas.openxmlformats.org/officeDocument/2006/relationships" xmlns:p="http://schemas.openxmlformats.org/presentationml/2006/main">
+  <p:cSld>
+    <p:spTree>
+      <p:nvGrpSpPr>
+        <p:cNvPr id="1" name=""/>
+        <p:cNvGrpSpPr/>
+        <p:nvPr/>
+      </p:nvGrpSpPr>
+      <p:grpSpPr>
+        <a:xfrm>
+          <a:off x="0" y="0"/>
+          <a:ext cx="0" cy="0"/>
+          <a:chOff x="0" y="0"/>
+          <a:chExt cx="0" cy="0"/>
+        </a:xfrm>
+      </p:grpSpPr>
+      <p:sp>
+        <p:nvSpPr>
+          <p:cNvPr id="2" name="Title 1">
+            <a:extLst>
+              <a:ext uri="{FF2B5EF4-FFF2-40B4-BE49-F238E27FC236}">
+                <a16:creationId xmlns:a16="http://schemas.microsoft.com/office/drawing/2014/main" id="{F07ABDF3-6F1B-526D-A8F2-5E5675B63221}"/>
+              </a:ext>
+            </a:extLst>
+          </p:cNvPr>
+          <p:cNvSpPr>
+            <a:spLocks noGrp="1"/>
+          </p:cNvSpPr>
+          <p:nvPr>
+            <p:ph type="title"/>
+          </p:nvPr>
+        </p:nvSpPr>
+        <p:spPr/>
+        <p:txBody>
+          <a:bodyPr/>
+          <a:lstStyle/>
+          <a:p>
+            <a:r>
+              <a:rPr lang="en-PH" dirty="0"/>
+              <a:t>PRPE paper conclusions</a:t>
+            </a:r>
+          </a:p>
+        </p:txBody>
+      </p:sp>
+      <p:sp>
+        <p:nvSpPr>
+          <p:cNvPr id="3" name="Content Placeholder 2">
+            <a:extLst>
+              <a:ext uri="{FF2B5EF4-FFF2-40B4-BE49-F238E27FC236}">
+                <a16:creationId xmlns:a16="http://schemas.microsoft.com/office/drawing/2014/main" id="{7034DEEE-B47E-8818-EDD6-B23814D93EBC}"/>
+              </a:ext>
+            </a:extLst>
+          </p:cNvPr>
+          <p:cNvSpPr>
+            <a:spLocks noGrp="1"/>
+          </p:cNvSpPr>
+          <p:nvPr>
+            <p:ph idx="1"/>
+          </p:nvPr>
+        </p:nvSpPr>
+        <p:spPr/>
+        <p:txBody>
+          <a:bodyPr>
+            <a:normAutofit fontScale="92500" lnSpcReduction="10000"/>
+          </a:bodyPr>
+          <a:lstStyle/>
+          <a:p>
+            <a:r>
+              <a:rPr lang="en-PH" dirty="0"/>
+              <a:t>Results of modelling PI as CA are consistent </a:t>
+            </a:r>
+            <a:br>
+              <a:rPr lang="en-PH" dirty="0"/>
+            </a:br>
+            <a:r>
+              <a:rPr lang="en-PH" dirty="0"/>
+              <a:t>with current findings</a:t>
+            </a:r>
+          </a:p>
+          <a:p>
+            <a:pPr lvl="1"/>
+            <a:r>
+              <a:rPr lang="en-PH" dirty="0"/>
+              <a:t>PI yields better or similar results to TI (3D plots, multiple)</a:t>
+            </a:r>
+          </a:p>
+          <a:p>
+            <a:pPr lvl="1"/>
+            <a:r>
+              <a:rPr lang="en-PH" dirty="0"/>
+              <a:t>PI is better for classes with slower learners than TI (3D plots)</a:t>
+            </a:r>
+          </a:p>
+          <a:p>
+            <a:pPr lvl="1"/>
+            <a:r>
+              <a:rPr lang="en-PH" dirty="0"/>
+              <a:t>Heterogeneity is bad</a:t>
+            </a:r>
+          </a:p>
+          <a:p>
+            <a:pPr lvl="1"/>
+            <a:r>
+              <a:rPr lang="en-PH" dirty="0"/>
+              <a:t>Current best practices validated</a:t>
+            </a:r>
+          </a:p>
+          <a:p>
+            <a:r>
+              <a:rPr lang="en-PH" dirty="0"/>
+              <a:t>New?:</a:t>
+            </a:r>
+          </a:p>
+          <a:p>
+            <a:pPr lvl="1"/>
+            <a:r>
+              <a:rPr lang="en-PH" dirty="0"/>
+              <a:t>Different dynamics (2-stage learning for TI, </a:t>
+            </a:r>
+            <a:br>
+              <a:rPr lang="en-PH" dirty="0"/>
+            </a:br>
+            <a:r>
+              <a:rPr lang="en-PH" dirty="0"/>
+              <a:t>S-curve evolution for PI)</a:t>
+            </a:r>
+          </a:p>
+          <a:p>
+            <a:pPr lvl="1"/>
+            <a:r>
+              <a:rPr lang="en-PH" dirty="0"/>
+              <a:t>Different optimal seating arrangement</a:t>
+            </a:r>
+          </a:p>
+        </p:txBody>
+      </p:sp>
+      <p:sp>
+        <p:nvSpPr>
+          <p:cNvPr id="4" name="Slide Number Placeholder 3">
+            <a:extLst>
+              <a:ext uri="{FF2B5EF4-FFF2-40B4-BE49-F238E27FC236}">
+                <a16:creationId xmlns:a16="http://schemas.microsoft.com/office/drawing/2014/main" id="{5D7F8D4A-9A0F-873F-69C1-4BDC9C77EE24}"/>
+              </a:ext>
+            </a:extLst>
+          </p:cNvPr>
+          <p:cNvSpPr>
+            <a:spLocks noGrp="1"/>
+          </p:cNvSpPr>
+          <p:nvPr>
+            <p:ph type="sldNum" sz="quarter" idx="12"/>
+          </p:nvPr>
+        </p:nvSpPr>
+        <p:spPr/>
+        <p:txBody>
+          <a:bodyPr/>
+          <a:lstStyle/>
+          <a:p>
+            <a:fld id="{32177519-FDB5-46C8-A273-662D2447F0A4}" type="slidenum">
+              <a:rPr lang="en-PH" smtClean="0"/>
+              <a:t>8</a:t>
+            </a:fld>
+            <a:endParaRPr lang="en-PH"/>
+          </a:p>
+        </p:txBody>
+      </p:sp>
+      <p:sp>
+        <p:nvSpPr>
+          <p:cNvPr id="5" name="Footer Placeholder 4">
+            <a:extLst>
+              <a:ext uri="{FF2B5EF4-FFF2-40B4-BE49-F238E27FC236}">
+                <a16:creationId xmlns:a16="http://schemas.microsoft.com/office/drawing/2014/main" id="{281263A0-A1C0-9758-7220-75B4CA0BE5DA}"/>
               </a:ext>
             </a:extLst>
           </p:cNvPr>
@@ -20725,7 +21018,7 @@
           <p:cNvPr id="6" name="Date Placeholder 5">
             <a:extLst>
               <a:ext uri="{FF2B5EF4-FFF2-40B4-BE49-F238E27FC236}">
-                <a16:creationId xmlns:a16="http://schemas.microsoft.com/office/drawing/2014/main" id="{094B3D97-15E6-6640-240A-043EE86260DD}"/>
+                <a16:creationId xmlns:a16="http://schemas.microsoft.com/office/drawing/2014/main" id="{E0B72CA8-21B4-4635-909B-D464A31AEB60}"/>
               </a:ext>
             </a:extLst>
           </p:cNvPr>
@@ -20742,8 +21035,8 @@
           <a:lstStyle/>
           <a:p>
             <a:r>
-              <a:rPr lang="en-US" dirty="0"/>
-              <a:t>2024.12.12</a:t>
+              <a:rPr lang="en-US"/>
+              <a:t>2025.02.06</a:t>
             </a:r>
             <a:endParaRPr lang="en-PH" dirty="0"/>
           </a:p>
@@ -20752,7 +21045,213 @@
     </p:spTree>
     <p:extLst>
       <p:ext uri="{BB962C8B-B14F-4D97-AF65-F5344CB8AC3E}">
-        <p14:creationId xmlns:p14="http://schemas.microsoft.com/office/powerpoint/2010/main" val="3865736279"/>
+        <p14:creationId xmlns:p14="http://schemas.microsoft.com/office/powerpoint/2010/main" val="1828315405"/>
+      </p:ext>
+    </p:extLst>
+  </p:cSld>
+  <p:clrMapOvr>
+    <a:masterClrMapping/>
+  </p:clrMapOvr>
+  <mc:AlternateContent xmlns:mc="http://schemas.openxmlformats.org/markup-compatibility/2006" xmlns:p14="http://schemas.microsoft.com/office/powerpoint/2010/main">
+    <mc:Choice Requires="p14">
+      <p:transition p14:dur="200">
+        <p:fade/>
+      </p:transition>
+    </mc:Choice>
+    <mc:Fallback xmlns="">
+      <p:transition>
+        <p:fade/>
+      </p:transition>
+    </mc:Fallback>
+  </mc:AlternateContent>
+</p:sld>
+</file>
+
+<file path=ppt/slides/slide9.xml><?xml version="1.0" encoding="utf-8"?>
+<p:sld xmlns:a="http://schemas.openxmlformats.org/drawingml/2006/main" xmlns:r="http://schemas.openxmlformats.org/officeDocument/2006/relationships" xmlns:p="http://schemas.openxmlformats.org/presentationml/2006/main">
+  <p:cSld>
+    <p:spTree>
+      <p:nvGrpSpPr>
+        <p:cNvPr id="1" name=""/>
+        <p:cNvGrpSpPr/>
+        <p:nvPr/>
+      </p:nvGrpSpPr>
+      <p:grpSpPr>
+        <a:xfrm>
+          <a:off x="0" y="0"/>
+          <a:ext cx="0" cy="0"/>
+          <a:chOff x="0" y="0"/>
+          <a:chExt cx="0" cy="0"/>
+        </a:xfrm>
+      </p:grpSpPr>
+      <p:sp>
+        <p:nvSpPr>
+          <p:cNvPr id="2" name="Title 1">
+            <a:extLst>
+              <a:ext uri="{FF2B5EF4-FFF2-40B4-BE49-F238E27FC236}">
+                <a16:creationId xmlns:a16="http://schemas.microsoft.com/office/drawing/2014/main" id="{E3383B26-D5C0-F32C-F004-9E900CFD1653}"/>
+              </a:ext>
+            </a:extLst>
+          </p:cNvPr>
+          <p:cNvSpPr>
+            <a:spLocks noGrp="1"/>
+          </p:cNvSpPr>
+          <p:nvPr>
+            <p:ph type="title"/>
+          </p:nvPr>
+        </p:nvSpPr>
+        <p:spPr/>
+        <p:txBody>
+          <a:bodyPr/>
+          <a:lstStyle/>
+          <a:p>
+            <a:r>
+              <a:rPr lang="en-PH" dirty="0"/>
+              <a:t>PRPE reminders:</a:t>
+            </a:r>
+          </a:p>
+        </p:txBody>
+      </p:sp>
+      <p:sp>
+        <p:nvSpPr>
+          <p:cNvPr id="3" name="Content Placeholder 2">
+            <a:extLst>
+              <a:ext uri="{FF2B5EF4-FFF2-40B4-BE49-F238E27FC236}">
+                <a16:creationId xmlns:a16="http://schemas.microsoft.com/office/drawing/2014/main" id="{6CEB1D19-E256-DE3A-0B7B-F23CB4D76927}"/>
+              </a:ext>
+            </a:extLst>
+          </p:cNvPr>
+          <p:cNvSpPr>
+            <a:spLocks noGrp="1"/>
+          </p:cNvSpPr>
+          <p:nvPr>
+            <p:ph idx="1"/>
+          </p:nvPr>
+        </p:nvSpPr>
+        <p:spPr/>
+        <p:txBody>
+          <a:bodyPr/>
+          <a:lstStyle/>
+          <a:p>
+            <a:r>
+              <a:rPr lang="en-PH" dirty="0"/>
+              <a:t>Cite SPP and Ma’am </a:t>
+            </a:r>
+            <a:r>
+              <a:rPr lang="en-PH" dirty="0" err="1"/>
+              <a:t>Ianne</a:t>
+            </a:r>
+            <a:endParaRPr lang="en-PH" dirty="0"/>
+          </a:p>
+          <a:p>
+            <a:r>
+              <a:rPr lang="en-PH" dirty="0"/>
+              <a:t>Ask ma’am </a:t>
+            </a:r>
+            <a:r>
+              <a:rPr lang="en-PH" dirty="0" err="1"/>
+              <a:t>Ianne</a:t>
+            </a:r>
+            <a:r>
+              <a:rPr lang="en-PH" dirty="0"/>
+              <a:t> to help review, middle author</a:t>
+            </a:r>
+          </a:p>
+          <a:p>
+            <a:r>
+              <a:rPr lang="en-PH" dirty="0"/>
+              <a:t>March 15, 2025 deadline to submit</a:t>
+            </a:r>
+          </a:p>
+        </p:txBody>
+      </p:sp>
+      <p:sp>
+        <p:nvSpPr>
+          <p:cNvPr id="4" name="Slide Number Placeholder 3">
+            <a:extLst>
+              <a:ext uri="{FF2B5EF4-FFF2-40B4-BE49-F238E27FC236}">
+                <a16:creationId xmlns:a16="http://schemas.microsoft.com/office/drawing/2014/main" id="{A2B9503D-2FB8-DB47-55C4-2453AEE9B111}"/>
+              </a:ext>
+            </a:extLst>
+          </p:cNvPr>
+          <p:cNvSpPr>
+            <a:spLocks noGrp="1"/>
+          </p:cNvSpPr>
+          <p:nvPr>
+            <p:ph type="sldNum" sz="quarter" idx="12"/>
+          </p:nvPr>
+        </p:nvSpPr>
+        <p:spPr/>
+        <p:txBody>
+          <a:bodyPr/>
+          <a:lstStyle/>
+          <a:p>
+            <a:fld id="{32177519-FDB5-46C8-A273-662D2447F0A4}" type="slidenum">
+              <a:rPr lang="en-PH" smtClean="0"/>
+              <a:t>9</a:t>
+            </a:fld>
+            <a:endParaRPr lang="en-PH"/>
+          </a:p>
+        </p:txBody>
+      </p:sp>
+      <p:sp>
+        <p:nvSpPr>
+          <p:cNvPr id="5" name="Footer Placeholder 4">
+            <a:extLst>
+              <a:ext uri="{FF2B5EF4-FFF2-40B4-BE49-F238E27FC236}">
+                <a16:creationId xmlns:a16="http://schemas.microsoft.com/office/drawing/2014/main" id="{2912BCBF-B0FD-8A89-BC28-5EFF8AFA24DC}"/>
+              </a:ext>
+            </a:extLst>
+          </p:cNvPr>
+          <p:cNvSpPr>
+            <a:spLocks noGrp="1"/>
+          </p:cNvSpPr>
+          <p:nvPr>
+            <p:ph type="ftr" sz="quarter" idx="3"/>
+          </p:nvPr>
+        </p:nvSpPr>
+        <p:spPr/>
+        <p:txBody>
+          <a:bodyPr/>
+          <a:lstStyle/>
+          <a:p>
+            <a:endParaRPr lang="en-PH" dirty="0"/>
+          </a:p>
+        </p:txBody>
+      </p:sp>
+      <p:sp>
+        <p:nvSpPr>
+          <p:cNvPr id="6" name="Date Placeholder 5">
+            <a:extLst>
+              <a:ext uri="{FF2B5EF4-FFF2-40B4-BE49-F238E27FC236}">
+                <a16:creationId xmlns:a16="http://schemas.microsoft.com/office/drawing/2014/main" id="{1838C877-8395-C760-E7F8-20D8BA893993}"/>
+              </a:ext>
+            </a:extLst>
+          </p:cNvPr>
+          <p:cNvSpPr>
+            <a:spLocks noGrp="1"/>
+          </p:cNvSpPr>
+          <p:nvPr>
+            <p:ph type="dt" sz="half" idx="2"/>
+          </p:nvPr>
+        </p:nvSpPr>
+        <p:spPr/>
+        <p:txBody>
+          <a:bodyPr/>
+          <a:lstStyle/>
+          <a:p>
+            <a:r>
+              <a:rPr lang="en-US"/>
+              <a:t>2025.02.06</a:t>
+            </a:r>
+            <a:endParaRPr lang="en-PH" dirty="0"/>
+          </a:p>
+        </p:txBody>
+      </p:sp>
+    </p:spTree>
+    <p:extLst>
+      <p:ext uri="{BB962C8B-B14F-4D97-AF65-F5344CB8AC3E}">
+        <p14:creationId xmlns:p14="http://schemas.microsoft.com/office/powerpoint/2010/main" val="1786857458"/>
       </p:ext>
     </p:extLst>
   </p:cSld>

</xml_diff>

<commit_message>
Update: RM slides and SPP2024 travel report
</commit_message>
<xml_diff>
--- a/documents/202425s2-RM-Slides-Sy.pptx
+++ b/documents/202425s2-RM-Slides-Sy.pptx
@@ -5,7 +5,7 @@
     <p:sldMasterId id="2147483657" r:id="rId1"/>
   </p:sldMasterIdLst>
   <p:notesMasterIdLst>
-    <p:notesMasterId r:id="rId11"/>
+    <p:notesMasterId r:id="rId15"/>
   </p:notesMasterIdLst>
   <p:sldIdLst>
     <p:sldId id="256" r:id="rId2"/>
@@ -17,6 +17,10 @@
     <p:sldId id="303" r:id="rId8"/>
     <p:sldId id="304" r:id="rId9"/>
     <p:sldId id="305" r:id="rId10"/>
+    <p:sldId id="306" r:id="rId11"/>
+    <p:sldId id="307" r:id="rId12"/>
+    <p:sldId id="308" r:id="rId13"/>
+    <p:sldId id="309" r:id="rId14"/>
   </p:sldIdLst>
   <p:sldSz cx="12192000" cy="6858000"/>
   <p:notesSz cx="6858000" cy="9144000"/>
@@ -6170,7 +6174,7 @@
           <a:p>
             <a:fld id="{B2B8B589-3DCF-4CC3-8CB1-8F263020D954}" type="datetimeFigureOut">
               <a:rPr lang="en-PH" smtClean="0"/>
-              <a:t>02/06/2025</a:t>
+              <a:t>03/25/2025</a:t>
             </a:fld>
             <a:endParaRPr lang="en-PH"/>
           </a:p>
@@ -6854,7 +6858,7 @@
           <a:p>
             <a:fld id="{843CB0FE-86D9-4EF0-AD61-3F5691C83FED}" type="datetimeFigureOut">
               <a:rPr lang="en-PH" smtClean="0"/>
-              <a:t>02/06/2025</a:t>
+              <a:t>03/25/2025</a:t>
             </a:fld>
             <a:endParaRPr lang="en-PH"/>
           </a:p>
@@ -12757,6 +12761,817 @@
     <p:extLst>
       <p:ext uri="{BB962C8B-B14F-4D97-AF65-F5344CB8AC3E}">
         <p14:creationId xmlns:p14="http://schemas.microsoft.com/office/powerpoint/2010/main" val="4269614947"/>
+      </p:ext>
+    </p:extLst>
+  </p:cSld>
+  <p:clrMapOvr>
+    <a:masterClrMapping/>
+  </p:clrMapOvr>
+  <mc:AlternateContent xmlns:mc="http://schemas.openxmlformats.org/markup-compatibility/2006" xmlns:p14="http://schemas.microsoft.com/office/powerpoint/2010/main">
+    <mc:Choice Requires="p14">
+      <p:transition p14:dur="200">
+        <p:fade/>
+      </p:transition>
+    </mc:Choice>
+    <mc:Fallback xmlns="">
+      <p:transition>
+        <p:fade/>
+      </p:transition>
+    </mc:Fallback>
+  </mc:AlternateContent>
+</p:sld>
+</file>
+
+<file path=ppt/slides/slide10.xml><?xml version="1.0" encoding="utf-8"?>
+<p:sld xmlns:a="http://schemas.openxmlformats.org/drawingml/2006/main" xmlns:r="http://schemas.openxmlformats.org/officeDocument/2006/relationships" xmlns:p="http://schemas.openxmlformats.org/presentationml/2006/main">
+  <p:cSld>
+    <p:spTree>
+      <p:nvGrpSpPr>
+        <p:cNvPr id="1" name=""/>
+        <p:cNvGrpSpPr/>
+        <p:nvPr/>
+      </p:nvGrpSpPr>
+      <p:grpSpPr>
+        <a:xfrm>
+          <a:off x="0" y="0"/>
+          <a:ext cx="0" cy="0"/>
+          <a:chOff x="0" y="0"/>
+          <a:chExt cx="0" cy="0"/>
+        </a:xfrm>
+      </p:grpSpPr>
+      <p:sp>
+        <p:nvSpPr>
+          <p:cNvPr id="2" name="Title 1">
+            <a:extLst>
+              <a:ext uri="{FF2B5EF4-FFF2-40B4-BE49-F238E27FC236}">
+                <a16:creationId xmlns:a16="http://schemas.microsoft.com/office/drawing/2014/main" id="{A339FC02-472F-8A7F-3446-0775C7130BC6}"/>
+              </a:ext>
+            </a:extLst>
+          </p:cNvPr>
+          <p:cNvSpPr>
+            <a:spLocks noGrp="1"/>
+          </p:cNvSpPr>
+          <p:nvPr>
+            <p:ph type="title"/>
+          </p:nvPr>
+        </p:nvSpPr>
+        <p:spPr/>
+        <p:txBody>
+          <a:bodyPr/>
+          <a:lstStyle/>
+          <a:p>
+            <a:r>
+              <a:rPr lang="en-PH" dirty="0"/>
+              <a:t>March 25, 2025</a:t>
+            </a:r>
+          </a:p>
+        </p:txBody>
+      </p:sp>
+      <p:sp>
+        <p:nvSpPr>
+          <p:cNvPr id="3" name="Slide Number Placeholder 2">
+            <a:extLst>
+              <a:ext uri="{FF2B5EF4-FFF2-40B4-BE49-F238E27FC236}">
+                <a16:creationId xmlns:a16="http://schemas.microsoft.com/office/drawing/2014/main" id="{80F18471-FA10-B507-9220-184DBD7D0E09}"/>
+              </a:ext>
+            </a:extLst>
+          </p:cNvPr>
+          <p:cNvSpPr>
+            <a:spLocks noGrp="1"/>
+          </p:cNvSpPr>
+          <p:nvPr>
+            <p:ph type="sldNum" sz="quarter" idx="12"/>
+          </p:nvPr>
+        </p:nvSpPr>
+        <p:spPr/>
+        <p:txBody>
+          <a:bodyPr/>
+          <a:lstStyle/>
+          <a:p>
+            <a:fld id="{32177519-FDB5-46C8-A273-662D2447F0A4}" type="slidenum">
+              <a:rPr lang="en-PH" smtClean="0"/>
+              <a:t>10</a:t>
+            </a:fld>
+            <a:endParaRPr lang="en-PH"/>
+          </a:p>
+        </p:txBody>
+      </p:sp>
+      <p:sp>
+        <p:nvSpPr>
+          <p:cNvPr id="4" name="Footer Placeholder 3">
+            <a:extLst>
+              <a:ext uri="{FF2B5EF4-FFF2-40B4-BE49-F238E27FC236}">
+                <a16:creationId xmlns:a16="http://schemas.microsoft.com/office/drawing/2014/main" id="{EDC7B8EF-9552-A9D7-2A07-25F0F97ECA7B}"/>
+              </a:ext>
+            </a:extLst>
+          </p:cNvPr>
+          <p:cNvSpPr>
+            <a:spLocks noGrp="1"/>
+          </p:cNvSpPr>
+          <p:nvPr>
+            <p:ph type="ftr" sz="quarter" idx="3"/>
+          </p:nvPr>
+        </p:nvSpPr>
+        <p:spPr/>
+        <p:txBody>
+          <a:bodyPr/>
+          <a:lstStyle/>
+          <a:p>
+            <a:endParaRPr lang="en-PH" dirty="0"/>
+          </a:p>
+        </p:txBody>
+      </p:sp>
+      <p:sp>
+        <p:nvSpPr>
+          <p:cNvPr id="5" name="Date Placeholder 4">
+            <a:extLst>
+              <a:ext uri="{FF2B5EF4-FFF2-40B4-BE49-F238E27FC236}">
+                <a16:creationId xmlns:a16="http://schemas.microsoft.com/office/drawing/2014/main" id="{C7E9F992-F492-5D4D-1DB0-22A85DE406B0}"/>
+              </a:ext>
+            </a:extLst>
+          </p:cNvPr>
+          <p:cNvSpPr>
+            <a:spLocks noGrp="1"/>
+          </p:cNvSpPr>
+          <p:nvPr>
+            <p:ph type="dt" sz="half" idx="2"/>
+          </p:nvPr>
+        </p:nvSpPr>
+        <p:spPr/>
+        <p:txBody>
+          <a:bodyPr/>
+          <a:lstStyle/>
+          <a:p>
+            <a:r>
+              <a:rPr lang="en-US"/>
+              <a:t>2024.12.12</a:t>
+            </a:r>
+            <a:endParaRPr lang="en-PH" dirty="0"/>
+          </a:p>
+        </p:txBody>
+      </p:sp>
+      <p:sp>
+        <p:nvSpPr>
+          <p:cNvPr id="6" name="Text Placeholder 5">
+            <a:extLst>
+              <a:ext uri="{FF2B5EF4-FFF2-40B4-BE49-F238E27FC236}">
+                <a16:creationId xmlns:a16="http://schemas.microsoft.com/office/drawing/2014/main" id="{F276459B-B61F-85BC-4C41-04FEB4A8FE4F}"/>
+              </a:ext>
+            </a:extLst>
+          </p:cNvPr>
+          <p:cNvSpPr>
+            <a:spLocks noGrp="1"/>
+          </p:cNvSpPr>
+          <p:nvPr>
+            <p:ph type="body" sz="quarter" idx="13"/>
+          </p:nvPr>
+        </p:nvSpPr>
+        <p:spPr/>
+        <p:txBody>
+          <a:bodyPr/>
+          <a:lstStyle/>
+          <a:p>
+            <a:r>
+              <a:rPr lang="en-PH" dirty="0"/>
+              <a:t>Potential new fitting function to keep comparability but has better interpretability</a:t>
+            </a:r>
+          </a:p>
+        </p:txBody>
+      </p:sp>
+    </p:spTree>
+    <p:extLst>
+      <p:ext uri="{BB962C8B-B14F-4D97-AF65-F5344CB8AC3E}">
+        <p14:creationId xmlns:p14="http://schemas.microsoft.com/office/powerpoint/2010/main" val="442974637"/>
+      </p:ext>
+    </p:extLst>
+  </p:cSld>
+  <p:clrMapOvr>
+    <a:masterClrMapping/>
+  </p:clrMapOvr>
+  <mc:AlternateContent xmlns:mc="http://schemas.openxmlformats.org/markup-compatibility/2006" xmlns:p14="http://schemas.microsoft.com/office/powerpoint/2010/main">
+    <mc:Choice Requires="p14">
+      <p:transition p14:dur="200">
+        <p:fade/>
+      </p:transition>
+    </mc:Choice>
+    <mc:Fallback xmlns="">
+      <p:transition>
+        <p:fade/>
+      </p:transition>
+    </mc:Fallback>
+  </mc:AlternateContent>
+</p:sld>
+</file>
+
+<file path=ppt/slides/slide11.xml><?xml version="1.0" encoding="utf-8"?>
+<p:sld xmlns:a="http://schemas.openxmlformats.org/drawingml/2006/main" xmlns:r="http://schemas.openxmlformats.org/officeDocument/2006/relationships" xmlns:p="http://schemas.openxmlformats.org/presentationml/2006/main">
+  <p:cSld>
+    <p:spTree>
+      <p:nvGrpSpPr>
+        <p:cNvPr id="1" name=""/>
+        <p:cNvGrpSpPr/>
+        <p:nvPr/>
+      </p:nvGrpSpPr>
+      <p:grpSpPr>
+        <a:xfrm>
+          <a:off x="0" y="0"/>
+          <a:ext cx="0" cy="0"/>
+          <a:chOff x="0" y="0"/>
+          <a:chExt cx="0" cy="0"/>
+        </a:xfrm>
+      </p:grpSpPr>
+      <p:sp>
+        <p:nvSpPr>
+          <p:cNvPr id="7" name="Title 6">
+            <a:extLst>
+              <a:ext uri="{FF2B5EF4-FFF2-40B4-BE49-F238E27FC236}">
+                <a16:creationId xmlns:a16="http://schemas.microsoft.com/office/drawing/2014/main" id="{1E52AFAE-3FFB-1A49-4CDF-325CCBF313CA}"/>
+              </a:ext>
+            </a:extLst>
+          </p:cNvPr>
+          <p:cNvSpPr>
+            <a:spLocks noGrp="1"/>
+          </p:cNvSpPr>
+          <p:nvPr>
+            <p:ph type="title"/>
+          </p:nvPr>
+        </p:nvSpPr>
+        <p:spPr>
+          <a:xfrm>
+            <a:off x="283265" y="694620"/>
+            <a:ext cx="9983415" cy="776288"/>
+          </a:xfrm>
+        </p:spPr>
+        <p:txBody>
+          <a:bodyPr anchor="ctr">
+            <a:normAutofit/>
+          </a:bodyPr>
+          <a:lstStyle/>
+          <a:p>
+            <a:r>
+              <a:rPr lang="en-PH" sz="3400"/>
+              <a:t>Generalized logistic function/Richard’s growth curve</a:t>
+            </a:r>
+          </a:p>
+        </p:txBody>
+      </p:sp>
+      <p:pic>
+        <p:nvPicPr>
+          <p:cNvPr id="39" name="Picture 38" descr="A screenshot of a computer&#10;&#10;AI-generated content may be incorrect.">
+            <a:extLst>
+              <a:ext uri="{FF2B5EF4-FFF2-40B4-BE49-F238E27FC236}">
+                <a16:creationId xmlns:a16="http://schemas.microsoft.com/office/drawing/2014/main" id="{28A3406F-1F4D-57A9-F0FA-68ACE34C6EED}"/>
+              </a:ext>
+            </a:extLst>
+          </p:cNvPr>
+          <p:cNvPicPr>
+            <a:picLocks noChangeAspect="1"/>
+          </p:cNvPicPr>
+          <p:nvPr/>
+        </p:nvPicPr>
+        <p:blipFill>
+          <a:blip r:embed="rId2"/>
+          <a:stretch>
+            <a:fillRect/>
+          </a:stretch>
+        </p:blipFill>
+        <p:spPr>
+          <a:xfrm>
+            <a:off x="471216" y="1733384"/>
+            <a:ext cx="11249568" cy="4443579"/>
+          </a:xfrm>
+          <a:prstGeom prst="rect">
+            <a:avLst/>
+          </a:prstGeom>
+          <a:noFill/>
+        </p:spPr>
+      </p:pic>
+      <p:sp>
+        <p:nvSpPr>
+          <p:cNvPr id="3" name="Slide Number Placeholder 2">
+            <a:extLst>
+              <a:ext uri="{FF2B5EF4-FFF2-40B4-BE49-F238E27FC236}">
+                <a16:creationId xmlns:a16="http://schemas.microsoft.com/office/drawing/2014/main" id="{723CE273-DC28-FD8C-CBCF-64B2E2335677}"/>
+              </a:ext>
+            </a:extLst>
+          </p:cNvPr>
+          <p:cNvSpPr>
+            <a:spLocks noGrp="1"/>
+          </p:cNvSpPr>
+          <p:nvPr>
+            <p:ph type="sldNum" sz="quarter" idx="12"/>
+          </p:nvPr>
+        </p:nvSpPr>
+        <p:spPr>
+          <a:xfrm>
+            <a:off x="11356219" y="6451565"/>
+            <a:ext cx="739019" cy="360000"/>
+          </a:xfrm>
+        </p:spPr>
+        <p:txBody>
+          <a:bodyPr>
+            <a:normAutofit/>
+          </a:bodyPr>
+          <a:lstStyle/>
+          <a:p>
+            <a:pPr>
+              <a:lnSpc>
+                <a:spcPct val="90000"/>
+              </a:lnSpc>
+              <a:spcAft>
+                <a:spcPts val="600"/>
+              </a:spcAft>
+            </a:pPr>
+            <a:fld id="{32177519-FDB5-46C8-A273-662D2447F0A4}" type="slidenum">
+              <a:rPr lang="en-PH" smtClean="0"/>
+              <a:pPr>
+                <a:lnSpc>
+                  <a:spcPct val="90000"/>
+                </a:lnSpc>
+                <a:spcAft>
+                  <a:spcPts val="600"/>
+                </a:spcAft>
+              </a:pPr>
+              <a:t>11</a:t>
+            </a:fld>
+            <a:endParaRPr lang="en-PH"/>
+          </a:p>
+        </p:txBody>
+      </p:sp>
+      <p:sp>
+        <p:nvSpPr>
+          <p:cNvPr id="1042" name="Footer Placeholder 4">
+            <a:extLst>
+              <a:ext uri="{FF2B5EF4-FFF2-40B4-BE49-F238E27FC236}">
+                <a16:creationId xmlns:a16="http://schemas.microsoft.com/office/drawing/2014/main" id="{F787579B-A397-BFE3-629A-142636CFD503}"/>
+              </a:ext>
+            </a:extLst>
+          </p:cNvPr>
+          <p:cNvSpPr>
+            <a:spLocks noGrp="1"/>
+          </p:cNvSpPr>
+          <p:nvPr>
+            <p:ph type="ftr" sz="quarter" idx="3"/>
+          </p:nvPr>
+        </p:nvSpPr>
+        <p:spPr>
+          <a:xfrm>
+            <a:off x="77411" y="6451565"/>
+            <a:ext cx="10096014" cy="360000"/>
+          </a:xfrm>
+        </p:spPr>
+        <p:txBody>
+          <a:bodyPr/>
+          <a:lstStyle/>
+          <a:p>
+            <a:pPr algn="l"/>
+            <a:r>
+              <a:rPr lang="en-PH" dirty="0"/>
+              <a:t>https://en.wikipedia.org/wiki/Logistic_function#Modeling_early_COVID-19_cases</a:t>
+            </a:r>
+          </a:p>
+        </p:txBody>
+      </p:sp>
+      <p:sp>
+        <p:nvSpPr>
+          <p:cNvPr id="5" name="Date Placeholder 4">
+            <a:extLst>
+              <a:ext uri="{FF2B5EF4-FFF2-40B4-BE49-F238E27FC236}">
+                <a16:creationId xmlns:a16="http://schemas.microsoft.com/office/drawing/2014/main" id="{2D9E44AE-B617-5898-34B1-9F0BDFD6FC87}"/>
+              </a:ext>
+            </a:extLst>
+          </p:cNvPr>
+          <p:cNvSpPr>
+            <a:spLocks noGrp="1"/>
+          </p:cNvSpPr>
+          <p:nvPr>
+            <p:ph type="dt" sz="half" idx="2"/>
+          </p:nvPr>
+        </p:nvSpPr>
+        <p:spPr>
+          <a:xfrm>
+            <a:off x="10220651" y="6451565"/>
+            <a:ext cx="1088342" cy="360000"/>
+          </a:xfrm>
+        </p:spPr>
+        <p:txBody>
+          <a:bodyPr anchor="ctr">
+            <a:normAutofit/>
+          </a:bodyPr>
+          <a:lstStyle/>
+          <a:p>
+            <a:pPr>
+              <a:spcAft>
+                <a:spcPts val="600"/>
+              </a:spcAft>
+            </a:pPr>
+            <a:r>
+              <a:rPr lang="en-US" dirty="0"/>
+              <a:t>2025.03.25</a:t>
+            </a:r>
+            <a:endParaRPr lang="en-PH" dirty="0"/>
+          </a:p>
+        </p:txBody>
+      </p:sp>
+    </p:spTree>
+    <p:extLst>
+      <p:ext uri="{BB962C8B-B14F-4D97-AF65-F5344CB8AC3E}">
+        <p14:creationId xmlns:p14="http://schemas.microsoft.com/office/powerpoint/2010/main" val="17239520"/>
+      </p:ext>
+    </p:extLst>
+  </p:cSld>
+  <p:clrMapOvr>
+    <a:masterClrMapping/>
+  </p:clrMapOvr>
+  <mc:AlternateContent xmlns:mc="http://schemas.openxmlformats.org/markup-compatibility/2006" xmlns:p14="http://schemas.microsoft.com/office/powerpoint/2010/main">
+    <mc:Choice Requires="p14">
+      <p:transition p14:dur="200">
+        <p:fade/>
+      </p:transition>
+    </mc:Choice>
+    <mc:Fallback xmlns="">
+      <p:transition>
+        <p:fade/>
+      </p:transition>
+    </mc:Fallback>
+  </mc:AlternateContent>
+</p:sld>
+</file>
+
+<file path=ppt/slides/slide12.xml><?xml version="1.0" encoding="utf-8"?>
+<p:sld xmlns:a="http://schemas.openxmlformats.org/drawingml/2006/main" xmlns:r="http://schemas.openxmlformats.org/officeDocument/2006/relationships" xmlns:p="http://schemas.openxmlformats.org/presentationml/2006/main">
+  <p:cSld>
+    <p:spTree>
+      <p:nvGrpSpPr>
+        <p:cNvPr id="1" name=""/>
+        <p:cNvGrpSpPr/>
+        <p:nvPr/>
+      </p:nvGrpSpPr>
+      <p:grpSpPr>
+        <a:xfrm>
+          <a:off x="0" y="0"/>
+          <a:ext cx="0" cy="0"/>
+          <a:chOff x="0" y="0"/>
+          <a:chExt cx="0" cy="0"/>
+        </a:xfrm>
+      </p:grpSpPr>
+      <p:sp>
+        <p:nvSpPr>
+          <p:cNvPr id="7" name="Title 6">
+            <a:extLst>
+              <a:ext uri="{FF2B5EF4-FFF2-40B4-BE49-F238E27FC236}">
+                <a16:creationId xmlns:a16="http://schemas.microsoft.com/office/drawing/2014/main" id="{93ED3EDE-E75D-77E6-AFA3-CAD266C2C510}"/>
+              </a:ext>
+            </a:extLst>
+          </p:cNvPr>
+          <p:cNvSpPr>
+            <a:spLocks noGrp="1"/>
+          </p:cNvSpPr>
+          <p:nvPr>
+            <p:ph type="title"/>
+          </p:nvPr>
+        </p:nvSpPr>
+        <p:spPr/>
+        <p:txBody>
+          <a:bodyPr/>
+          <a:lstStyle/>
+          <a:p>
+            <a:r>
+              <a:rPr lang="en-PH" dirty="0"/>
+              <a:t>Idea: </a:t>
+            </a:r>
+            <a:r>
+              <a:rPr lang="en-PH" dirty="0" err="1"/>
+              <a:t>DynamicalSystems.jl</a:t>
+            </a:r>
+            <a:endParaRPr lang="en-PH" dirty="0"/>
+          </a:p>
+        </p:txBody>
+      </p:sp>
+      <p:sp>
+        <p:nvSpPr>
+          <p:cNvPr id="8" name="Content Placeholder 7">
+            <a:extLst>
+              <a:ext uri="{FF2B5EF4-FFF2-40B4-BE49-F238E27FC236}">
+                <a16:creationId xmlns:a16="http://schemas.microsoft.com/office/drawing/2014/main" id="{D8F5CBCA-BF9B-B5E5-8436-2F260625EA95}"/>
+              </a:ext>
+            </a:extLst>
+          </p:cNvPr>
+          <p:cNvSpPr>
+            <a:spLocks noGrp="1"/>
+          </p:cNvSpPr>
+          <p:nvPr>
+            <p:ph idx="1"/>
+          </p:nvPr>
+        </p:nvSpPr>
+        <p:spPr/>
+        <p:txBody>
+          <a:bodyPr/>
+          <a:lstStyle/>
+          <a:p>
+            <a:r>
+              <a:rPr lang="en-PH" dirty="0"/>
+              <a:t>Not sure if I can apply built-in analysis to my system/data</a:t>
+            </a:r>
+          </a:p>
+          <a:p>
+            <a:r>
+              <a:rPr lang="en-PH" dirty="0"/>
+              <a:t>For observed/measured data: </a:t>
+            </a:r>
+            <a:r>
+              <a:rPr lang="en-PH" dirty="0" err="1"/>
+              <a:t>ComplexityMeasures.jl</a:t>
+            </a:r>
+            <a:endParaRPr lang="en-PH" dirty="0"/>
+          </a:p>
+          <a:p>
+            <a:pPr lvl="1"/>
+            <a:r>
+              <a:rPr lang="en-PH" dirty="0"/>
+              <a:t>Probabilities, info measures, complexity measures</a:t>
+            </a:r>
+          </a:p>
+          <a:p>
+            <a:r>
+              <a:rPr lang="en-PH" dirty="0"/>
+              <a:t>!! Don’t really understand docs</a:t>
+            </a:r>
+          </a:p>
+        </p:txBody>
+      </p:sp>
+      <p:sp>
+        <p:nvSpPr>
+          <p:cNvPr id="4" name="Slide Number Placeholder 3">
+            <a:extLst>
+              <a:ext uri="{FF2B5EF4-FFF2-40B4-BE49-F238E27FC236}">
+                <a16:creationId xmlns:a16="http://schemas.microsoft.com/office/drawing/2014/main" id="{F9AA4E32-7D5F-E4F3-A8F9-7D73E51C3553}"/>
+              </a:ext>
+            </a:extLst>
+          </p:cNvPr>
+          <p:cNvSpPr>
+            <a:spLocks noGrp="1"/>
+          </p:cNvSpPr>
+          <p:nvPr>
+            <p:ph type="sldNum" sz="quarter" idx="12"/>
+          </p:nvPr>
+        </p:nvSpPr>
+        <p:spPr/>
+        <p:txBody>
+          <a:bodyPr/>
+          <a:lstStyle/>
+          <a:p>
+            <a:fld id="{32177519-FDB5-46C8-A273-662D2447F0A4}" type="slidenum">
+              <a:rPr lang="en-PH" smtClean="0"/>
+              <a:t>12</a:t>
+            </a:fld>
+            <a:endParaRPr lang="en-PH"/>
+          </a:p>
+        </p:txBody>
+      </p:sp>
+      <p:sp>
+        <p:nvSpPr>
+          <p:cNvPr id="5" name="Footer Placeholder 4">
+            <a:extLst>
+              <a:ext uri="{FF2B5EF4-FFF2-40B4-BE49-F238E27FC236}">
+                <a16:creationId xmlns:a16="http://schemas.microsoft.com/office/drawing/2014/main" id="{535997C4-EA05-DD95-B0C8-BB1F22813B04}"/>
+              </a:ext>
+            </a:extLst>
+          </p:cNvPr>
+          <p:cNvSpPr>
+            <a:spLocks noGrp="1"/>
+          </p:cNvSpPr>
+          <p:nvPr>
+            <p:ph type="ftr" sz="quarter" idx="3"/>
+          </p:nvPr>
+        </p:nvSpPr>
+        <p:spPr/>
+        <p:txBody>
+          <a:bodyPr/>
+          <a:lstStyle/>
+          <a:p>
+            <a:endParaRPr lang="en-PH" dirty="0"/>
+          </a:p>
+        </p:txBody>
+      </p:sp>
+      <p:sp>
+        <p:nvSpPr>
+          <p:cNvPr id="6" name="Date Placeholder 5">
+            <a:extLst>
+              <a:ext uri="{FF2B5EF4-FFF2-40B4-BE49-F238E27FC236}">
+                <a16:creationId xmlns:a16="http://schemas.microsoft.com/office/drawing/2014/main" id="{CAAD6A9A-EF93-AF51-DE80-E2857B95A1E5}"/>
+              </a:ext>
+            </a:extLst>
+          </p:cNvPr>
+          <p:cNvSpPr>
+            <a:spLocks noGrp="1"/>
+          </p:cNvSpPr>
+          <p:nvPr>
+            <p:ph type="dt" sz="half" idx="2"/>
+          </p:nvPr>
+        </p:nvSpPr>
+        <p:spPr/>
+        <p:txBody>
+          <a:bodyPr/>
+          <a:lstStyle/>
+          <a:p>
+            <a:r>
+              <a:rPr lang="en-US"/>
+              <a:t>2024.09.19</a:t>
+            </a:r>
+            <a:endParaRPr lang="en-PH" dirty="0"/>
+          </a:p>
+        </p:txBody>
+      </p:sp>
+    </p:spTree>
+    <p:extLst>
+      <p:ext uri="{BB962C8B-B14F-4D97-AF65-F5344CB8AC3E}">
+        <p14:creationId xmlns:p14="http://schemas.microsoft.com/office/powerpoint/2010/main" val="3935084230"/>
+      </p:ext>
+    </p:extLst>
+  </p:cSld>
+  <p:clrMapOvr>
+    <a:masterClrMapping/>
+  </p:clrMapOvr>
+  <mc:AlternateContent xmlns:mc="http://schemas.openxmlformats.org/markup-compatibility/2006" xmlns:p14="http://schemas.microsoft.com/office/powerpoint/2010/main">
+    <mc:Choice Requires="p14">
+      <p:transition p14:dur="200">
+        <p:fade/>
+      </p:transition>
+    </mc:Choice>
+    <mc:Fallback xmlns="">
+      <p:transition>
+        <p:fade/>
+      </p:transition>
+    </mc:Fallback>
+  </mc:AlternateContent>
+</p:sld>
+</file>
+
+<file path=ppt/slides/slide13.xml><?xml version="1.0" encoding="utf-8"?>
+<p:sld xmlns:a="http://schemas.openxmlformats.org/drawingml/2006/main" xmlns:r="http://schemas.openxmlformats.org/officeDocument/2006/relationships" xmlns:p="http://schemas.openxmlformats.org/presentationml/2006/main">
+  <p:cSld>
+    <p:spTree>
+      <p:nvGrpSpPr>
+        <p:cNvPr id="1" name=""/>
+        <p:cNvGrpSpPr/>
+        <p:nvPr/>
+      </p:nvGrpSpPr>
+      <p:grpSpPr>
+        <a:xfrm>
+          <a:off x="0" y="0"/>
+          <a:ext cx="0" cy="0"/>
+          <a:chOff x="0" y="0"/>
+          <a:chExt cx="0" cy="0"/>
+        </a:xfrm>
+      </p:grpSpPr>
+      <p:sp>
+        <p:nvSpPr>
+          <p:cNvPr id="2" name="Slide Number Placeholder 1">
+            <a:extLst>
+              <a:ext uri="{FF2B5EF4-FFF2-40B4-BE49-F238E27FC236}">
+                <a16:creationId xmlns:a16="http://schemas.microsoft.com/office/drawing/2014/main" id="{E5C96A32-5CB6-7D4F-A24C-1D615F71ED4D}"/>
+              </a:ext>
+            </a:extLst>
+          </p:cNvPr>
+          <p:cNvSpPr>
+            <a:spLocks noGrp="1"/>
+          </p:cNvSpPr>
+          <p:nvPr>
+            <p:ph type="sldNum" sz="quarter" idx="12"/>
+          </p:nvPr>
+        </p:nvSpPr>
+        <p:spPr/>
+        <p:txBody>
+          <a:bodyPr/>
+          <a:lstStyle/>
+          <a:p>
+            <a:fld id="{32177519-FDB5-46C8-A273-662D2447F0A4}" type="slidenum">
+              <a:rPr lang="en-PH" smtClean="0"/>
+              <a:t>13</a:t>
+            </a:fld>
+            <a:endParaRPr lang="en-PH"/>
+          </a:p>
+        </p:txBody>
+      </p:sp>
+      <p:sp>
+        <p:nvSpPr>
+          <p:cNvPr id="3" name="Footer Placeholder 2">
+            <a:extLst>
+              <a:ext uri="{FF2B5EF4-FFF2-40B4-BE49-F238E27FC236}">
+                <a16:creationId xmlns:a16="http://schemas.microsoft.com/office/drawing/2014/main" id="{44832668-14F9-74D1-9965-7D19D1B9B717}"/>
+              </a:ext>
+            </a:extLst>
+          </p:cNvPr>
+          <p:cNvSpPr>
+            <a:spLocks noGrp="1"/>
+          </p:cNvSpPr>
+          <p:nvPr>
+            <p:ph type="ftr" sz="quarter" idx="3"/>
+          </p:nvPr>
+        </p:nvSpPr>
+        <p:spPr/>
+        <p:txBody>
+          <a:bodyPr/>
+          <a:lstStyle/>
+          <a:p>
+            <a:endParaRPr lang="en-PH" dirty="0"/>
+          </a:p>
+        </p:txBody>
+      </p:sp>
+      <p:sp>
+        <p:nvSpPr>
+          <p:cNvPr id="4" name="Date Placeholder 3">
+            <a:extLst>
+              <a:ext uri="{FF2B5EF4-FFF2-40B4-BE49-F238E27FC236}">
+                <a16:creationId xmlns:a16="http://schemas.microsoft.com/office/drawing/2014/main" id="{553F2431-382C-D32C-866C-8AEF75F69B70}"/>
+              </a:ext>
+            </a:extLst>
+          </p:cNvPr>
+          <p:cNvSpPr>
+            <a:spLocks noGrp="1"/>
+          </p:cNvSpPr>
+          <p:nvPr>
+            <p:ph type="dt" sz="half" idx="2"/>
+          </p:nvPr>
+        </p:nvSpPr>
+        <p:spPr/>
+        <p:txBody>
+          <a:bodyPr/>
+          <a:lstStyle/>
+          <a:p>
+            <a:r>
+              <a:rPr lang="en-US"/>
+              <a:t>2024.09.19</a:t>
+            </a:r>
+            <a:endParaRPr lang="en-PH" dirty="0"/>
+          </a:p>
+        </p:txBody>
+      </p:sp>
+      <p:pic>
+        <p:nvPicPr>
+          <p:cNvPr id="14" name="Picture 13">
+            <a:extLst>
+              <a:ext uri="{FF2B5EF4-FFF2-40B4-BE49-F238E27FC236}">
+                <a16:creationId xmlns:a16="http://schemas.microsoft.com/office/drawing/2014/main" id="{72FB3AA3-0EC6-1861-874B-DBED4E92CB30}"/>
+              </a:ext>
+            </a:extLst>
+          </p:cNvPr>
+          <p:cNvPicPr>
+            <a:picLocks noChangeAspect="1"/>
+          </p:cNvPicPr>
+          <p:nvPr/>
+        </p:nvPicPr>
+        <p:blipFill>
+          <a:blip r:embed="rId2"/>
+          <a:stretch>
+            <a:fillRect/>
+          </a:stretch>
+        </p:blipFill>
+        <p:spPr>
+          <a:xfrm>
+            <a:off x="268898" y="1449000"/>
+            <a:ext cx="5614061" cy="3960000"/>
+          </a:xfrm>
+          <a:prstGeom prst="rect">
+            <a:avLst/>
+          </a:prstGeom>
+        </p:spPr>
+      </p:pic>
+      <p:pic>
+        <p:nvPicPr>
+          <p:cNvPr id="16" name="Picture 15">
+            <a:extLst>
+              <a:ext uri="{FF2B5EF4-FFF2-40B4-BE49-F238E27FC236}">
+                <a16:creationId xmlns:a16="http://schemas.microsoft.com/office/drawing/2014/main" id="{5DD7DD54-BCEC-2D61-7BD1-ABA0C9FF5B76}"/>
+              </a:ext>
+            </a:extLst>
+          </p:cNvPr>
+          <p:cNvPicPr>
+            <a:picLocks noChangeAspect="1"/>
+          </p:cNvPicPr>
+          <p:nvPr/>
+        </p:nvPicPr>
+        <p:blipFill>
+          <a:blip r:embed="rId3"/>
+          <a:stretch>
+            <a:fillRect/>
+          </a:stretch>
+        </p:blipFill>
+        <p:spPr>
+          <a:xfrm>
+            <a:off x="5922245" y="1449000"/>
+            <a:ext cx="5637033" cy="3960000"/>
+          </a:xfrm>
+          <a:prstGeom prst="rect">
+            <a:avLst/>
+          </a:prstGeom>
+        </p:spPr>
+      </p:pic>
+    </p:spTree>
+    <p:extLst>
+      <p:ext uri="{BB962C8B-B14F-4D97-AF65-F5344CB8AC3E}">
+        <p14:creationId xmlns:p14="http://schemas.microsoft.com/office/powerpoint/2010/main" val="631496217"/>
       </p:ext>
     </p:extLst>
   </p:cSld>

</xml_diff>